<commit_message>
update readme, numpy notebooks, eda slides
</commit_message>
<xml_diff>
--- a/slides/03_eda_data.pptx
+++ b/slides/03_eda_data.pptx
@@ -8,9 +8,9 @@
     <p:sldId id="256" r:id="rId2"/>
     <p:sldId id="257" r:id="rId3"/>
     <p:sldId id="258" r:id="rId4"/>
-    <p:sldId id="431" r:id="rId5"/>
-    <p:sldId id="259" r:id="rId6"/>
-    <p:sldId id="260" r:id="rId7"/>
+    <p:sldId id="260" r:id="rId5"/>
+    <p:sldId id="431" r:id="rId6"/>
+    <p:sldId id="259" r:id="rId7"/>
     <p:sldId id="262" r:id="rId8"/>
     <p:sldId id="267" r:id="rId9"/>
     <p:sldId id="261" r:id="rId10"/>
@@ -283,7 +283,7 @@
           <a:p>
             <a:fld id="{02CE11C6-247B-0242-8651-D958C13D6FF0}" type="datetimeFigureOut">
               <a:rPr lang="en-US" smtClean="0"/>
-              <a:t>8/5/18</a:t>
+              <a:t>9/11/18</a:t>
             </a:fld>
             <a:endParaRPr lang="en-US"/>
           </a:p>
@@ -511,7 +511,7 @@
           <a:p>
             <a:fld id="{02CE11C6-247B-0242-8651-D958C13D6FF0}" type="datetimeFigureOut">
               <a:rPr lang="en-US" smtClean="0"/>
-              <a:t>8/5/18</a:t>
+              <a:t>9/11/18</a:t>
             </a:fld>
             <a:endParaRPr lang="en-US"/>
           </a:p>
@@ -719,7 +719,7 @@
           <a:p>
             <a:fld id="{02CE11C6-247B-0242-8651-D958C13D6FF0}" type="datetimeFigureOut">
               <a:rPr lang="en-US" smtClean="0"/>
-              <a:t>8/5/18</a:t>
+              <a:t>9/11/18</a:t>
             </a:fld>
             <a:endParaRPr lang="en-US"/>
           </a:p>
@@ -917,7 +917,7 @@
           <a:p>
             <a:fld id="{02CE11C6-247B-0242-8651-D958C13D6FF0}" type="datetimeFigureOut">
               <a:rPr lang="en-US" smtClean="0"/>
-              <a:t>8/5/18</a:t>
+              <a:t>9/11/18</a:t>
             </a:fld>
             <a:endParaRPr lang="en-US"/>
           </a:p>
@@ -1192,7 +1192,7 @@
           <a:p>
             <a:fld id="{02CE11C6-247B-0242-8651-D958C13D6FF0}" type="datetimeFigureOut">
               <a:rPr lang="en-US" smtClean="0"/>
-              <a:t>8/5/18</a:t>
+              <a:t>9/11/18</a:t>
             </a:fld>
             <a:endParaRPr lang="en-US"/>
           </a:p>
@@ -1457,7 +1457,7 @@
           <a:p>
             <a:fld id="{02CE11C6-247B-0242-8651-D958C13D6FF0}" type="datetimeFigureOut">
               <a:rPr lang="en-US" smtClean="0"/>
-              <a:t>8/5/18</a:t>
+              <a:t>9/11/18</a:t>
             </a:fld>
             <a:endParaRPr lang="en-US"/>
           </a:p>
@@ -1869,7 +1869,7 @@
           <a:p>
             <a:fld id="{02CE11C6-247B-0242-8651-D958C13D6FF0}" type="datetimeFigureOut">
               <a:rPr lang="en-US" smtClean="0"/>
-              <a:t>8/5/18</a:t>
+              <a:t>9/11/18</a:t>
             </a:fld>
             <a:endParaRPr lang="en-US"/>
           </a:p>
@@ -2010,7 +2010,7 @@
           <a:p>
             <a:fld id="{02CE11C6-247B-0242-8651-D958C13D6FF0}" type="datetimeFigureOut">
               <a:rPr lang="en-US" smtClean="0"/>
-              <a:t>8/5/18</a:t>
+              <a:t>9/11/18</a:t>
             </a:fld>
             <a:endParaRPr lang="en-US"/>
           </a:p>
@@ -2123,7 +2123,7 @@
           <a:p>
             <a:fld id="{02CE11C6-247B-0242-8651-D958C13D6FF0}" type="datetimeFigureOut">
               <a:rPr lang="en-US" smtClean="0"/>
-              <a:t>8/5/18</a:t>
+              <a:t>9/11/18</a:t>
             </a:fld>
             <a:endParaRPr lang="en-US"/>
           </a:p>
@@ -2434,7 +2434,7 @@
           <a:p>
             <a:fld id="{02CE11C6-247B-0242-8651-D958C13D6FF0}" type="datetimeFigureOut">
               <a:rPr lang="en-US" smtClean="0"/>
-              <a:t>8/5/18</a:t>
+              <a:t>9/11/18</a:t>
             </a:fld>
             <a:endParaRPr lang="en-US"/>
           </a:p>
@@ -2722,7 +2722,7 @@
           <a:p>
             <a:fld id="{02CE11C6-247B-0242-8651-D958C13D6FF0}" type="datetimeFigureOut">
               <a:rPr lang="en-US" smtClean="0"/>
-              <a:t>8/5/18</a:t>
+              <a:t>9/11/18</a:t>
             </a:fld>
             <a:endParaRPr lang="en-US"/>
           </a:p>
@@ -2963,7 +2963,7 @@
           <a:p>
             <a:fld id="{02CE11C6-247B-0242-8651-D958C13D6FF0}" type="datetimeFigureOut">
               <a:rPr lang="en-US" smtClean="0"/>
-              <a:t>8/5/18</a:t>
+              <a:t>9/11/18</a:t>
             </a:fld>
             <a:endParaRPr lang="en-US"/>
           </a:p>
@@ -3693,6 +3693,13 @@
             <a:pPr lvl="1"/>
             <a:r>
               <a:rPr lang="en-US" dirty="0"/>
+              <a:t>True zero</a:t>
+            </a:r>
+          </a:p>
+          <a:p>
+            <a:pPr lvl="1"/>
+            <a:r>
+              <a:rPr lang="en-US" dirty="0"/>
               <a:t>Mathematical operations of +, -, /, * are valid</a:t>
             </a:r>
           </a:p>
@@ -4066,13 +4073,13 @@
         <p:spPr/>
         <p:txBody>
           <a:bodyPr>
-            <a:normAutofit fontScale="85000" lnSpcReduction="20000"/>
+            <a:normAutofit fontScale="77500" lnSpcReduction="20000"/>
           </a:bodyPr>
           <a:lstStyle/>
           <a:p>
             <a:r>
               <a:rPr lang="en-US" dirty="0"/>
-              <a:t>Measuring individual deliveries; the variables are Time, Day, Number of Produce. </a:t>
+              <a:t>Measuring individual deliveries; the variables are Time, Day, and Number of Produce. </a:t>
             </a:r>
           </a:p>
           <a:p>
@@ -4088,6 +4095,9 @@
             <a:endParaRPr lang="en-US" dirty="0"/>
           </a:p>
           <a:p>
+            <a:endParaRPr lang="en-US" dirty="0"/>
+          </a:p>
+          <a:p>
             <a:r>
               <a:rPr lang="en-US" dirty="0"/>
               <a:t>Problem: each column header represents a single value rather than a variable. </a:t>
@@ -4102,15 +4112,7 @@
           <a:p>
             <a:r>
               <a:rPr lang="en-US" dirty="0"/>
-              <a:t>The values of the </a:t>
-            </a:r>
-            <a:r>
-              <a:rPr lang="en-US" dirty="0" err="1"/>
-              <a:t>variable,“Number</a:t>
-            </a:r>
-            <a:r>
-              <a:rPr lang="en-US" dirty="0"/>
-              <a:t> of Produce”, is not recorded in a single column. </a:t>
+              <a:t>The values of the variable, “Number of Produce”, is not recorded in a single column. </a:t>
             </a:r>
           </a:p>
           <a:p>
@@ -4156,8 +4158,8 @@
         </p:blipFill>
         <p:spPr>
           <a:xfrm>
-            <a:off x="2892986" y="2323728"/>
-            <a:ext cx="5473700" cy="1816100"/>
+            <a:off x="3666476" y="2304789"/>
+            <a:ext cx="4700209" cy="1559466"/>
           </a:xfrm>
           <a:prstGeom prst="rect">
             <a:avLst/>
@@ -4660,13 +4662,13 @@
           <a:p>
             <a:r>
               <a:rPr lang="en-US" dirty="0"/>
-              <a:t>Variables are stored in both rows and columns</a:t>
-            </a:r>
-          </a:p>
-          <a:p>
-            <a:r>
-              <a:rPr lang="en-US" dirty="0"/>
-              <a:t>Multiple variables are stored in one column</a:t>
+              <a:t>Variables are stored in rows or columns</a:t>
+            </a:r>
+          </a:p>
+          <a:p>
+            <a:r>
+              <a:rPr lang="en-US" dirty="0"/>
+              <a:t>Multiple (different) variables are stored in one column</a:t>
             </a:r>
           </a:p>
           <a:p>
@@ -4693,7 +4695,7 @@
           <a:p>
             <a:r>
               <a:rPr lang="en-US" dirty="0"/>
-              <a:t>We want each file to correspond to a dataset, each column to represent a single variable and each row to represent a single observation. </a:t>
+              <a:t>We want each file to correspond to a dataset, each column to represent a single variable, and each row to represent a single observation. </a:t>
             </a:r>
           </a:p>
           <a:p>
@@ -5704,7 +5706,12 @@
             <p:ph idx="1"/>
           </p:nvPr>
         </p:nvSpPr>
-        <p:spPr/>
+        <p:spPr>
+          <a:xfrm>
+            <a:off x="838200" y="1362162"/>
+            <a:ext cx="10515600" cy="4351338"/>
+          </a:xfrm>
+        </p:spPr>
         <p:txBody>
           <a:bodyPr>
             <a:normAutofit/>
@@ -5768,8 +5775,8 @@
         </p:blipFill>
         <p:spPr bwMode="auto">
           <a:xfrm>
-            <a:off x="2773016" y="3195712"/>
-            <a:ext cx="5913783" cy="3478138"/>
+            <a:off x="2522496" y="2668817"/>
+            <a:ext cx="6872025" cy="4041720"/>
           </a:xfrm>
           <a:prstGeom prst="rect">
             <a:avLst/>
@@ -6040,7 +6047,7 @@
           <p:cNvPr id="2" name="Title 1">
             <a:extLst>
               <a:ext uri="{FF2B5EF4-FFF2-40B4-BE49-F238E27FC236}">
-                <a16:creationId xmlns:a16="http://schemas.microsoft.com/office/drawing/2014/main" id="{2F2874DA-BCFC-9845-93DF-44A7131C49C3}"/>
+                <a16:creationId xmlns:a16="http://schemas.microsoft.com/office/drawing/2014/main" id="{26765FB1-5D82-EC40-B4C5-6CFC56210EE5}"/>
               </a:ext>
             </a:extLst>
           </p:cNvPr>
@@ -6058,7 +6065,7 @@
           <a:p>
             <a:r>
               <a:rPr lang="en-US" dirty="0"/>
-              <a:t>APIs, wrappers</a:t>
+              <a:t>Collecting data</a:t>
             </a:r>
           </a:p>
         </p:txBody>
@@ -6068,7 +6075,7 @@
           <p:cNvPr id="3" name="Content Placeholder 2">
             <a:extLst>
               <a:ext uri="{FF2B5EF4-FFF2-40B4-BE49-F238E27FC236}">
-                <a16:creationId xmlns:a16="http://schemas.microsoft.com/office/drawing/2014/main" id="{517C5E13-EF7A-EB47-B4F1-67AC23BEF4A2}"/>
+                <a16:creationId xmlns:a16="http://schemas.microsoft.com/office/drawing/2014/main" id="{F98E909A-5099-774C-A0FB-0AB7726EAC71}"/>
               </a:ext>
             </a:extLst>
           </p:cNvPr>
@@ -6079,12 +6086,7 @@
             <p:ph idx="1"/>
           </p:nvPr>
         </p:nvSpPr>
-        <p:spPr>
-          <a:xfrm>
-            <a:off x="838200" y="1825624"/>
-            <a:ext cx="10515600" cy="4775591"/>
-          </a:xfrm>
-        </p:spPr>
+        <p:spPr/>
         <p:txBody>
           <a:bodyPr>
             <a:normAutofit/>
@@ -6093,105 +6095,70 @@
           <a:p>
             <a:r>
               <a:rPr lang="en-US" dirty="0"/>
-              <a:t>HTML Parsing </a:t>
+              <a:t>Internal sources</a:t>
             </a:r>
           </a:p>
           <a:p>
             <a:pPr lvl="1"/>
             <a:r>
               <a:rPr lang="en-US" dirty="0"/>
-              <a:t>curl requests and </a:t>
-            </a:r>
-            <a:r>
-              <a:rPr lang="en-US" dirty="0" err="1"/>
-              <a:t>BeautifulSoup</a:t>
-            </a:r>
-            <a:r>
-              <a:rPr lang="en-US" dirty="0"/>
-              <a:t> </a:t>
-            </a:r>
-          </a:p>
-          <a:p>
-            <a:r>
-              <a:rPr lang="en-US" dirty="0"/>
-              <a:t>APIs</a:t>
+              <a:t>Already collected by an organization</a:t>
             </a:r>
           </a:p>
           <a:p>
             <a:pPr lvl="1"/>
             <a:r>
               <a:rPr lang="en-US" dirty="0"/>
-              <a:t>Makes the call for us (the author is “allowing us” to access the data)</a:t>
+              <a:t>E.g., transaction data, click-stream data, survey data, text, images</a:t>
+            </a:r>
+          </a:p>
+          <a:p>
+            <a:r>
+              <a:rPr lang="en-US" dirty="0"/>
+              <a:t>External sources</a:t>
             </a:r>
           </a:p>
           <a:p>
             <a:pPr lvl="1"/>
             <a:r>
-              <a:rPr lang="en-US" dirty="0">
-                <a:hlinkClick r:id="rId2"/>
-              </a:rPr>
-              <a:t>http://www.pythonforbeginners.com/api/list-of-python-apis</a:t>
-            </a:r>
-            <a:r>
-              <a:rPr lang="en-US" dirty="0"/>
-              <a:t> </a:t>
+              <a:rPr lang="en-US" dirty="0"/>
+              <a:t>Outside source through download or API</a:t>
+            </a:r>
+          </a:p>
+          <a:p>
+            <a:pPr lvl="2"/>
+            <a:r>
+              <a:rPr lang="en-US" dirty="0"/>
+              <a:t>Web service, RDF (Resource Description Framework), RSS (Rich Site Summary) web feed, data download (UCI Machine Learning repository), web scraping.</a:t>
+            </a:r>
+          </a:p>
+          <a:p>
+            <a:pPr lvl="2"/>
+            <a:r>
+              <a:rPr lang="en-US" dirty="0"/>
+              <a:t>E.g., Census, Medicaid, Google trends, Twitter API, Google Maps, stock market data, research datasets</a:t>
             </a:r>
           </a:p>
           <a:p>
             <a:pPr lvl="1"/>
             <a:r>
               <a:rPr lang="en-US" dirty="0"/>
-              <a:t>Examples:</a:t>
+              <a:t>Outside source where acquisition requires special processing</a:t>
             </a:r>
           </a:p>
           <a:p>
             <a:pPr lvl="2"/>
             <a:r>
               <a:rPr lang="en-US" dirty="0"/>
-              <a:t>Google</a:t>
-            </a:r>
-          </a:p>
-          <a:p>
-            <a:pPr lvl="2"/>
-            <a:r>
-              <a:rPr lang="en-US" dirty="0"/>
-              <a:t>Amazon (price data)</a:t>
-            </a:r>
-          </a:p>
-          <a:p>
-            <a:pPr lvl="2"/>
-            <a:r>
-              <a:rPr lang="en-US" dirty="0"/>
-              <a:t>Twitter (tweets)</a:t>
-            </a:r>
-          </a:p>
-          <a:p>
-            <a:pPr lvl="2"/>
-            <a:r>
-              <a:rPr lang="en-US" dirty="0"/>
-              <a:t>Facebook (social network)</a:t>
-            </a:r>
-          </a:p>
-          <a:p>
-            <a:pPr lvl="2"/>
-            <a:r>
-              <a:rPr lang="en-US" dirty="0"/>
-              <a:t>Web services that we author</a:t>
-            </a:r>
-          </a:p>
-          <a:p>
-            <a:pPr lvl="1"/>
-            <a:endParaRPr lang="en-US" dirty="0"/>
-          </a:p>
-          <a:p>
-            <a:endParaRPr lang="en-US" dirty="0"/>
+              <a:t>E.g., data on websites/web scraping, pictures, printed form, i.e., pdf.</a:t>
+            </a:r>
           </a:p>
         </p:txBody>
       </p:sp>
     </p:spTree>
     <p:extLst>
       <p:ext uri="{BB962C8B-B14F-4D97-AF65-F5344CB8AC3E}">
-        <p14:creationId xmlns:p14="http://schemas.microsoft.com/office/powerpoint/2010/main" val="2659746273"/>
+        <p14:creationId xmlns:p14="http://schemas.microsoft.com/office/powerpoint/2010/main" val="3420787219"/>
       </p:ext>
     </p:extLst>
   </p:cSld>
@@ -6223,6 +6190,189 @@
           <p:cNvPr id="2" name="Title 1">
             <a:extLst>
               <a:ext uri="{FF2B5EF4-FFF2-40B4-BE49-F238E27FC236}">
+                <a16:creationId xmlns:a16="http://schemas.microsoft.com/office/drawing/2014/main" id="{2F2874DA-BCFC-9845-93DF-44A7131C49C3}"/>
+              </a:ext>
+            </a:extLst>
+          </p:cNvPr>
+          <p:cNvSpPr>
+            <a:spLocks noGrp="1"/>
+          </p:cNvSpPr>
+          <p:nvPr>
+            <p:ph type="title"/>
+          </p:nvPr>
+        </p:nvSpPr>
+        <p:spPr/>
+        <p:txBody>
+          <a:bodyPr/>
+          <a:lstStyle/>
+          <a:p>
+            <a:r>
+              <a:rPr lang="en-US" dirty="0"/>
+              <a:t>APIs, wrappers</a:t>
+            </a:r>
+          </a:p>
+        </p:txBody>
+      </p:sp>
+      <p:sp>
+        <p:nvSpPr>
+          <p:cNvPr id="3" name="Content Placeholder 2">
+            <a:extLst>
+              <a:ext uri="{FF2B5EF4-FFF2-40B4-BE49-F238E27FC236}">
+                <a16:creationId xmlns:a16="http://schemas.microsoft.com/office/drawing/2014/main" id="{517C5E13-EF7A-EB47-B4F1-67AC23BEF4A2}"/>
+              </a:ext>
+            </a:extLst>
+          </p:cNvPr>
+          <p:cNvSpPr>
+            <a:spLocks noGrp="1"/>
+          </p:cNvSpPr>
+          <p:nvPr>
+            <p:ph idx="1"/>
+          </p:nvPr>
+        </p:nvSpPr>
+        <p:spPr>
+          <a:xfrm>
+            <a:off x="838200" y="1825624"/>
+            <a:ext cx="10515600" cy="4775591"/>
+          </a:xfrm>
+        </p:spPr>
+        <p:txBody>
+          <a:bodyPr>
+            <a:normAutofit/>
+          </a:bodyPr>
+          <a:lstStyle/>
+          <a:p>
+            <a:r>
+              <a:rPr lang="en-US" dirty="0"/>
+              <a:t>HTML Parsing </a:t>
+            </a:r>
+          </a:p>
+          <a:p>
+            <a:pPr lvl="1"/>
+            <a:r>
+              <a:rPr lang="en-US" dirty="0"/>
+              <a:t>curl requests and </a:t>
+            </a:r>
+            <a:r>
+              <a:rPr lang="en-US" dirty="0" err="1"/>
+              <a:t>BeautifulSoup</a:t>
+            </a:r>
+            <a:r>
+              <a:rPr lang="en-US" dirty="0"/>
+              <a:t> </a:t>
+            </a:r>
+          </a:p>
+          <a:p>
+            <a:r>
+              <a:rPr lang="en-US" dirty="0"/>
+              <a:t>APIs</a:t>
+            </a:r>
+          </a:p>
+          <a:p>
+            <a:pPr lvl="1"/>
+            <a:r>
+              <a:rPr lang="en-US" dirty="0"/>
+              <a:t>Makes the call for us (the author is “allowing us” to access the data)</a:t>
+            </a:r>
+          </a:p>
+          <a:p>
+            <a:pPr lvl="1"/>
+            <a:r>
+              <a:rPr lang="en-US" dirty="0">
+                <a:hlinkClick r:id="rId2"/>
+              </a:rPr>
+              <a:t>http://www.pythonforbeginners.com/api/list-of-python-apis</a:t>
+            </a:r>
+            <a:r>
+              <a:rPr lang="en-US" dirty="0"/>
+              <a:t> </a:t>
+            </a:r>
+          </a:p>
+          <a:p>
+            <a:pPr lvl="1"/>
+            <a:r>
+              <a:rPr lang="en-US" dirty="0"/>
+              <a:t>Examples:</a:t>
+            </a:r>
+          </a:p>
+          <a:p>
+            <a:pPr lvl="2"/>
+            <a:r>
+              <a:rPr lang="en-US" dirty="0"/>
+              <a:t>Google</a:t>
+            </a:r>
+          </a:p>
+          <a:p>
+            <a:pPr lvl="2"/>
+            <a:r>
+              <a:rPr lang="en-US" dirty="0"/>
+              <a:t>Amazon (price data)</a:t>
+            </a:r>
+          </a:p>
+          <a:p>
+            <a:pPr lvl="2"/>
+            <a:r>
+              <a:rPr lang="en-US" dirty="0"/>
+              <a:t>Twitter (tweets)</a:t>
+            </a:r>
+          </a:p>
+          <a:p>
+            <a:pPr lvl="2"/>
+            <a:r>
+              <a:rPr lang="en-US" dirty="0"/>
+              <a:t>Facebook (social network)</a:t>
+            </a:r>
+          </a:p>
+          <a:p>
+            <a:pPr lvl="2"/>
+            <a:r>
+              <a:rPr lang="en-US" dirty="0"/>
+              <a:t>Web services that we author</a:t>
+            </a:r>
+          </a:p>
+          <a:p>
+            <a:pPr lvl="1"/>
+            <a:endParaRPr lang="en-US" dirty="0"/>
+          </a:p>
+          <a:p>
+            <a:endParaRPr lang="en-US" dirty="0"/>
+          </a:p>
+        </p:txBody>
+      </p:sp>
+    </p:spTree>
+    <p:extLst>
+      <p:ext uri="{BB962C8B-B14F-4D97-AF65-F5344CB8AC3E}">
+        <p14:creationId xmlns:p14="http://schemas.microsoft.com/office/powerpoint/2010/main" val="2659746273"/>
+      </p:ext>
+    </p:extLst>
+  </p:cSld>
+  <p:clrMapOvr>
+    <a:masterClrMapping/>
+  </p:clrMapOvr>
+</p:sld>
+</file>
+
+<file path=ppt/slides/slide6.xml><?xml version="1.0" encoding="utf-8"?>
+<p:sld xmlns:a="http://schemas.openxmlformats.org/drawingml/2006/main" xmlns:r="http://schemas.openxmlformats.org/officeDocument/2006/relationships" xmlns:p="http://schemas.openxmlformats.org/presentationml/2006/main">
+  <p:cSld>
+    <p:spTree>
+      <p:nvGrpSpPr>
+        <p:cNvPr id="1" name=""/>
+        <p:cNvGrpSpPr/>
+        <p:nvPr/>
+      </p:nvGrpSpPr>
+      <p:grpSpPr>
+        <a:xfrm>
+          <a:off x="0" y="0"/>
+          <a:ext cx="0" cy="0"/>
+          <a:chOff x="0" y="0"/>
+          <a:chExt cx="0" cy="0"/>
+        </a:xfrm>
+      </p:grpSpPr>
+      <p:sp>
+        <p:nvSpPr>
+          <p:cNvPr id="2" name="Title 1">
+            <a:extLst>
+              <a:ext uri="{FF2B5EF4-FFF2-40B4-BE49-F238E27FC236}">
                 <a16:creationId xmlns:a16="http://schemas.microsoft.com/office/drawing/2014/main" id="{63F449C6-99B4-D14B-896C-946AF5E81A9D}"/>
               </a:ext>
             </a:extLst>
@@ -6268,10 +6418,9 @@
           <a:lstStyle/>
           <a:p>
             <a:r>
-              <a:rPr lang="en-US" dirty="0" err="1"/>
-              <a:t>Dataum</a:t>
-            </a:r>
-            <a:endParaRPr lang="en-US" dirty="0"/>
+              <a:rPr lang="en-US" dirty="0"/>
+              <a:t>Datum</a:t>
+            </a:r>
           </a:p>
           <a:p>
             <a:pPr lvl="1"/>
@@ -6338,149 +6487,6 @@
 </p:sld>
 </file>
 
-<file path=ppt/slides/slide6.xml><?xml version="1.0" encoding="utf-8"?>
-<p:sld xmlns:a="http://schemas.openxmlformats.org/drawingml/2006/main" xmlns:r="http://schemas.openxmlformats.org/officeDocument/2006/relationships" xmlns:p="http://schemas.openxmlformats.org/presentationml/2006/main">
-  <p:cSld>
-    <p:spTree>
-      <p:nvGrpSpPr>
-        <p:cNvPr id="1" name=""/>
-        <p:cNvGrpSpPr/>
-        <p:nvPr/>
-      </p:nvGrpSpPr>
-      <p:grpSpPr>
-        <a:xfrm>
-          <a:off x="0" y="0"/>
-          <a:ext cx="0" cy="0"/>
-          <a:chOff x="0" y="0"/>
-          <a:chExt cx="0" cy="0"/>
-        </a:xfrm>
-      </p:grpSpPr>
-      <p:sp>
-        <p:nvSpPr>
-          <p:cNvPr id="2" name="Title 1">
-            <a:extLst>
-              <a:ext uri="{FF2B5EF4-FFF2-40B4-BE49-F238E27FC236}">
-                <a16:creationId xmlns:a16="http://schemas.microsoft.com/office/drawing/2014/main" id="{26765FB1-5D82-EC40-B4C5-6CFC56210EE5}"/>
-              </a:ext>
-            </a:extLst>
-          </p:cNvPr>
-          <p:cNvSpPr>
-            <a:spLocks noGrp="1"/>
-          </p:cNvSpPr>
-          <p:nvPr>
-            <p:ph type="title"/>
-          </p:nvPr>
-        </p:nvSpPr>
-        <p:spPr/>
-        <p:txBody>
-          <a:bodyPr/>
-          <a:lstStyle/>
-          <a:p>
-            <a:r>
-              <a:rPr lang="en-US" dirty="0"/>
-              <a:t>Collecting data</a:t>
-            </a:r>
-          </a:p>
-        </p:txBody>
-      </p:sp>
-      <p:sp>
-        <p:nvSpPr>
-          <p:cNvPr id="3" name="Content Placeholder 2">
-            <a:extLst>
-              <a:ext uri="{FF2B5EF4-FFF2-40B4-BE49-F238E27FC236}">
-                <a16:creationId xmlns:a16="http://schemas.microsoft.com/office/drawing/2014/main" id="{F98E909A-5099-774C-A0FB-0AB7726EAC71}"/>
-              </a:ext>
-            </a:extLst>
-          </p:cNvPr>
-          <p:cNvSpPr>
-            <a:spLocks noGrp="1"/>
-          </p:cNvSpPr>
-          <p:nvPr>
-            <p:ph idx="1"/>
-          </p:nvPr>
-        </p:nvSpPr>
-        <p:spPr/>
-        <p:txBody>
-          <a:bodyPr>
-            <a:normAutofit/>
-          </a:bodyPr>
-          <a:lstStyle/>
-          <a:p>
-            <a:r>
-              <a:rPr lang="en-US" dirty="0"/>
-              <a:t>Internal sources</a:t>
-            </a:r>
-          </a:p>
-          <a:p>
-            <a:pPr lvl="1"/>
-            <a:r>
-              <a:rPr lang="en-US" dirty="0"/>
-              <a:t>Already collected by an organization</a:t>
-            </a:r>
-          </a:p>
-          <a:p>
-            <a:pPr lvl="1"/>
-            <a:r>
-              <a:rPr lang="en-US" dirty="0"/>
-              <a:t>E.g., transaction data, click-stream data, survey data, text, images</a:t>
-            </a:r>
-          </a:p>
-          <a:p>
-            <a:r>
-              <a:rPr lang="en-US" dirty="0"/>
-              <a:t>External sources</a:t>
-            </a:r>
-          </a:p>
-          <a:p>
-            <a:pPr lvl="1"/>
-            <a:r>
-              <a:rPr lang="en-US" dirty="0"/>
-              <a:t>Outside source through download or API</a:t>
-            </a:r>
-          </a:p>
-          <a:p>
-            <a:pPr lvl="2"/>
-            <a:r>
-              <a:rPr lang="en-US" dirty="0"/>
-              <a:t>Web service, RDF (Resource Description Framework), RSS (Rich Site Summary) web feed, data download (UCI Machine Learning repository), web scraping.</a:t>
-            </a:r>
-          </a:p>
-          <a:p>
-            <a:pPr lvl="2"/>
-            <a:r>
-              <a:rPr lang="en-US" dirty="0"/>
-              <a:t>E.g., Census, Medicaid, Google trends, Twitter API, Google Maps, stock market data, research datasets</a:t>
-            </a:r>
-          </a:p>
-          <a:p>
-            <a:pPr lvl="1"/>
-            <a:r>
-              <a:rPr lang="en-US" dirty="0"/>
-              <a:t>Outside source where acquisition requires special processing</a:t>
-            </a:r>
-          </a:p>
-          <a:p>
-            <a:pPr lvl="2"/>
-            <a:r>
-              <a:rPr lang="en-US" dirty="0"/>
-              <a:t>E.g., data on websites/web scraping, pictures, printed form, i.e., pdf.</a:t>
-            </a:r>
-          </a:p>
-        </p:txBody>
-      </p:sp>
-    </p:spTree>
-    <p:extLst>
-      <p:ext uri="{BB962C8B-B14F-4D97-AF65-F5344CB8AC3E}">
-        <p14:creationId xmlns:p14="http://schemas.microsoft.com/office/powerpoint/2010/main" val="3420787219"/>
-      </p:ext>
-    </p:extLst>
-  </p:cSld>
-  <p:clrMapOvr>
-    <a:masterClrMapping/>
-  </p:clrMapOvr>
-</p:sld>
-</file>
-
 <file path=ppt/slides/slide7.xml><?xml version="1.0" encoding="utf-8"?>
 <p:sld xmlns:a="http://schemas.openxmlformats.org/drawingml/2006/main" xmlns:r="http://schemas.openxmlformats.org/officeDocument/2006/relationships" xmlns:p="http://schemas.openxmlformats.org/presentationml/2006/main">
   <p:cSld>
@@ -6755,7 +6761,7 @@
             <a:pPr lvl="2"/>
             <a:r>
               <a:rPr lang="en-US" dirty="0"/>
-              <a:t>For example: Height and weight are a continuous variable </a:t>
+              <a:t>For example: Height and weight are a continuous variables </a:t>
             </a:r>
           </a:p>
           <a:p>

</xml_diff>